<commit_message>
update Version control slides
</commit_message>
<xml_diff>
--- a/static/courses/10-VersionControl.pptx
+++ b/static/courses/10-VersionControl.pptx
@@ -206,7 +206,7 @@
           <a:p>
             <a:fld id="{C8EA3B5B-6446-6246-BD8A-EBD208FEE7FC}" type="datetimeFigureOut">
               <a:rPr lang="en-US" smtClean="0"/>
-              <a:t>6/8/16</a:t>
+              <a:t>9/7/16</a:t>
             </a:fld>
             <a:endParaRPr lang="en-US"/>
           </a:p>
@@ -655,7 +655,7 @@
           <a:p>
             <a:fld id="{7D69ABD8-CC08-634C-8959-69E2F102606D}" type="datetimeFigureOut">
               <a:rPr lang="en-US" smtClean="0"/>
-              <a:t>6/8/16</a:t>
+              <a:t>9/7/16</a:t>
             </a:fld>
             <a:endParaRPr lang="en-US"/>
           </a:p>
@@ -825,7 +825,7 @@
           <a:p>
             <a:fld id="{7D69ABD8-CC08-634C-8959-69E2F102606D}" type="datetimeFigureOut">
               <a:rPr lang="en-US" smtClean="0"/>
-              <a:t>6/8/16</a:t>
+              <a:t>9/7/16</a:t>
             </a:fld>
             <a:endParaRPr lang="en-US"/>
           </a:p>
@@ -1005,7 +1005,7 @@
           <a:p>
             <a:fld id="{7D69ABD8-CC08-634C-8959-69E2F102606D}" type="datetimeFigureOut">
               <a:rPr lang="en-US" smtClean="0"/>
-              <a:t>6/8/16</a:t>
+              <a:t>9/7/16</a:t>
             </a:fld>
             <a:endParaRPr lang="en-US"/>
           </a:p>
@@ -1175,7 +1175,7 @@
           <a:p>
             <a:fld id="{7D69ABD8-CC08-634C-8959-69E2F102606D}" type="datetimeFigureOut">
               <a:rPr lang="en-US" smtClean="0"/>
-              <a:t>6/8/16</a:t>
+              <a:t>9/7/16</a:t>
             </a:fld>
             <a:endParaRPr lang="en-US"/>
           </a:p>
@@ -1421,7 +1421,7 @@
           <a:p>
             <a:fld id="{7D69ABD8-CC08-634C-8959-69E2F102606D}" type="datetimeFigureOut">
               <a:rPr lang="en-US" smtClean="0"/>
-              <a:t>6/8/16</a:t>
+              <a:t>9/7/16</a:t>
             </a:fld>
             <a:endParaRPr lang="en-US"/>
           </a:p>
@@ -1709,7 +1709,7 @@
           <a:p>
             <a:fld id="{7D69ABD8-CC08-634C-8959-69E2F102606D}" type="datetimeFigureOut">
               <a:rPr lang="en-US" smtClean="0"/>
-              <a:t>6/8/16</a:t>
+              <a:t>9/7/16</a:t>
             </a:fld>
             <a:endParaRPr lang="en-US"/>
           </a:p>
@@ -2131,7 +2131,7 @@
           <a:p>
             <a:fld id="{7D69ABD8-CC08-634C-8959-69E2F102606D}" type="datetimeFigureOut">
               <a:rPr lang="en-US" smtClean="0"/>
-              <a:t>6/8/16</a:t>
+              <a:t>9/7/16</a:t>
             </a:fld>
             <a:endParaRPr lang="en-US"/>
           </a:p>
@@ -2249,7 +2249,7 @@
           <a:p>
             <a:fld id="{7D69ABD8-CC08-634C-8959-69E2F102606D}" type="datetimeFigureOut">
               <a:rPr lang="en-US" smtClean="0"/>
-              <a:t>6/8/16</a:t>
+              <a:t>9/7/16</a:t>
             </a:fld>
             <a:endParaRPr lang="en-US"/>
           </a:p>
@@ -2344,7 +2344,7 @@
           <a:p>
             <a:fld id="{7D69ABD8-CC08-634C-8959-69E2F102606D}" type="datetimeFigureOut">
               <a:rPr lang="en-US" smtClean="0"/>
-              <a:t>6/8/16</a:t>
+              <a:t>9/7/16</a:t>
             </a:fld>
             <a:endParaRPr lang="en-US"/>
           </a:p>
@@ -2621,7 +2621,7 @@
           <a:p>
             <a:fld id="{7D69ABD8-CC08-634C-8959-69E2F102606D}" type="datetimeFigureOut">
               <a:rPr lang="en-US" smtClean="0"/>
-              <a:t>6/8/16</a:t>
+              <a:t>9/7/16</a:t>
             </a:fld>
             <a:endParaRPr lang="en-US"/>
           </a:p>
@@ -2874,7 +2874,7 @@
           <a:p>
             <a:fld id="{7D69ABD8-CC08-634C-8959-69E2F102606D}" type="datetimeFigureOut">
               <a:rPr lang="en-US" smtClean="0"/>
-              <a:t>6/8/16</a:t>
+              <a:t>9/7/16</a:t>
             </a:fld>
             <a:endParaRPr lang="en-US"/>
           </a:p>
@@ -3087,7 +3087,7 @@
           <a:p>
             <a:fld id="{7D69ABD8-CC08-634C-8959-69E2F102606D}" type="datetimeFigureOut">
               <a:rPr lang="en-US" smtClean="0"/>
-              <a:t>6/8/16</a:t>
+              <a:t>9/7/16</a:t>
             </a:fld>
             <a:endParaRPr lang="en-US"/>
           </a:p>
@@ -3582,7 +3582,7 @@
         </p:spPr>
         <p:txBody>
           <a:bodyPr>
-            <a:normAutofit fontScale="92500"/>
+            <a:normAutofit fontScale="92500" lnSpcReduction="20000"/>
           </a:bodyPr>
           <a:lstStyle/>
           <a:p>
@@ -3603,8 +3603,20 @@
             </a:r>
             <a:r>
               <a:rPr lang="en-US" dirty="0" smtClean="0"/>
-              <a:t> that you want it to track &lt;filename&gt;</a:t>
-            </a:r>
+              <a:t> that you want it to track &lt;filename</a:t>
+            </a:r>
+            <a:r>
+              <a:rPr lang="en-US" dirty="0" smtClean="0"/>
+              <a:t>&gt;</a:t>
+            </a:r>
+          </a:p>
+          <a:p>
+            <a:pPr lvl="1"/>
+            <a:r>
+              <a:rPr lang="en-US" dirty="0" smtClean="0"/>
+              <a:t>“add –A” to add all files</a:t>
+            </a:r>
+            <a:endParaRPr lang="en-US" dirty="0" smtClean="0"/>
           </a:p>
           <a:p>
             <a:r>
@@ -3623,8 +3635,32 @@
             <a:pPr lvl="1"/>
             <a:r>
               <a:rPr lang="en-US" dirty="0" smtClean="0"/>
-              <a:t>Add a meaningful commit message</a:t>
-            </a:r>
+              <a:t>Add a meaningful commit </a:t>
+            </a:r>
+            <a:r>
+              <a:rPr lang="en-US" dirty="0" smtClean="0"/>
+              <a:t>message</a:t>
+            </a:r>
+          </a:p>
+          <a:p>
+            <a:pPr lvl="1"/>
+            <a:r>
+              <a:rPr lang="en-US" dirty="0"/>
+              <a:t>“</a:t>
+            </a:r>
+            <a:r>
+              <a:rPr lang="en-US" dirty="0" err="1"/>
+              <a:t>git</a:t>
+            </a:r>
+            <a:r>
+              <a:rPr lang="en-US" dirty="0"/>
+              <a:t> commit </a:t>
+            </a:r>
+            <a:r>
+              <a:rPr lang="en-US" dirty="0" smtClean="0"/>
+              <a:t>–am” to add and commit all modified files</a:t>
+            </a:r>
+            <a:endParaRPr lang="en-US" dirty="0" smtClean="0"/>
           </a:p>
           <a:p>
             <a:r>
@@ -3763,10 +3799,7 @@
               </a:rPr>
               <a:t>AngularJS</a:t>
             </a:r>
-            <a:r>
-              <a:rPr lang="en-US" dirty="0" smtClean="0"/>
-              <a:t> </a:t>
-            </a:r>
+            <a:endParaRPr lang="en-US" dirty="0" smtClean="0"/>
           </a:p>
           <a:p>
             <a:r>
@@ -4735,35 +4768,13 @@
           <a:p>
             <a:pPr lvl="1"/>
             <a:r>
-              <a:rPr lang="en-US" dirty="0" smtClean="0"/>
-              <a:t>It’s free</a:t>
-            </a:r>
-          </a:p>
-          <a:p>
-            <a:r>
-              <a:rPr lang="en-US" dirty="0" smtClean="0"/>
-              <a:t>If you want to use another service</a:t>
-            </a:r>
-          </a:p>
-          <a:p>
-            <a:pPr lvl="1"/>
-            <a:r>
-              <a:rPr lang="en-US" dirty="0" smtClean="0"/>
-              <a:t>Let me know</a:t>
-            </a:r>
-          </a:p>
-          <a:p>
-            <a:pPr lvl="1"/>
-            <a:r>
-              <a:rPr lang="en-US" dirty="0" smtClean="0">
-                <a:hlinkClick r:id="rId3"/>
-              </a:rPr>
-              <a:t>BitBucket</a:t>
-            </a:r>
-            <a:endParaRPr lang="en-US" dirty="0" smtClean="0"/>
-          </a:p>
-          <a:p>
-            <a:pPr lvl="1"/>
+              <a:rPr lang="en-US" smtClean="0"/>
+              <a:t>It’s </a:t>
+            </a:r>
+            <a:r>
+              <a:rPr lang="en-US" smtClean="0"/>
+              <a:t>free</a:t>
+            </a:r>
             <a:endParaRPr lang="en-US" dirty="0" smtClean="0"/>
           </a:p>
         </p:txBody>
@@ -4771,7 +4782,7 @@
       <p:pic>
         <p:nvPicPr>
           <p:cNvPr id="4" name="Picture 3">
-            <a:hlinkClick r:id="rId4"/>
+            <a:hlinkClick r:id="rId3"/>
           </p:cNvPr>
           <p:cNvPicPr>
             <a:picLocks noChangeAspect="1"/>
@@ -4779,7 +4790,7 @@
           <p:nvPr/>
         </p:nvPicPr>
         <p:blipFill>
-          <a:blip r:embed="rId5"/>
+          <a:blip r:embed="rId4"/>
           <a:stretch>
             <a:fillRect/>
           </a:stretch>
@@ -5008,153 +5019,6 @@
                       </p:childTnLst>
                     </p:cTn>
                   </p:par>
-                  <p:par>
-                    <p:cTn id="19" fill="hold">
-                      <p:stCondLst>
-                        <p:cond delay="indefinite"/>
-                      </p:stCondLst>
-                      <p:childTnLst>
-                        <p:par>
-                          <p:cTn id="20" fill="hold">
-                            <p:stCondLst>
-                              <p:cond delay="0"/>
-                            </p:stCondLst>
-                            <p:childTnLst>
-                              <p:par>
-                                <p:cTn id="21" presetID="1" presetClass="entr" presetSubtype="0" fill="hold" grpId="0" nodeType="clickEffect">
-                                  <p:stCondLst>
-                                    <p:cond delay="0"/>
-                                  </p:stCondLst>
-                                  <p:childTnLst>
-                                    <p:set>
-                                      <p:cBhvr>
-                                        <p:cTn id="22" dur="1" fill="hold">
-                                          <p:stCondLst>
-                                            <p:cond delay="0"/>
-                                          </p:stCondLst>
-                                        </p:cTn>
-                                        <p:tgtEl>
-                                          <p:spTgt spid="3">
-                                            <p:txEl>
-                                              <p:pRg st="5" end="5"/>
-                                            </p:txEl>
-                                          </p:spTgt>
-                                        </p:tgtEl>
-                                        <p:attrNameLst>
-                                          <p:attrName>style.visibility</p:attrName>
-                                        </p:attrNameLst>
-                                      </p:cBhvr>
-                                      <p:to>
-                                        <p:strVal val="visible"/>
-                                      </p:to>
-                                    </p:set>
-                                  </p:childTnLst>
-                                </p:cTn>
-                              </p:par>
-                            </p:childTnLst>
-                          </p:cTn>
-                        </p:par>
-                      </p:childTnLst>
-                    </p:cTn>
-                  </p:par>
-                  <p:par>
-                    <p:cTn id="23" fill="hold">
-                      <p:stCondLst>
-                        <p:cond delay="indefinite"/>
-                      </p:stCondLst>
-                      <p:childTnLst>
-                        <p:par>
-                          <p:cTn id="24" fill="hold">
-                            <p:stCondLst>
-                              <p:cond delay="0"/>
-                            </p:stCondLst>
-                            <p:childTnLst>
-                              <p:par>
-                                <p:cTn id="25" presetID="1" presetClass="entr" presetSubtype="0" fill="hold" grpId="0" nodeType="clickEffect">
-                                  <p:stCondLst>
-                                    <p:cond delay="0"/>
-                                  </p:stCondLst>
-                                  <p:childTnLst>
-                                    <p:set>
-                                      <p:cBhvr>
-                                        <p:cTn id="26" dur="1" fill="hold">
-                                          <p:stCondLst>
-                                            <p:cond delay="0"/>
-                                          </p:stCondLst>
-                                        </p:cTn>
-                                        <p:tgtEl>
-                                          <p:spTgt spid="3">
-                                            <p:txEl>
-                                              <p:pRg st="6" end="6"/>
-                                            </p:txEl>
-                                          </p:spTgt>
-                                        </p:tgtEl>
-                                        <p:attrNameLst>
-                                          <p:attrName>style.visibility</p:attrName>
-                                        </p:attrNameLst>
-                                      </p:cBhvr>
-                                      <p:to>
-                                        <p:strVal val="visible"/>
-                                      </p:to>
-                                    </p:set>
-                                  </p:childTnLst>
-                                </p:cTn>
-                              </p:par>
-                            </p:childTnLst>
-                          </p:cTn>
-                        </p:par>
-                      </p:childTnLst>
-                    </p:cTn>
-                  </p:par>
-                  <p:par>
-                    <p:cTn id="27" fill="hold">
-                      <p:stCondLst>
-                        <p:cond delay="indefinite"/>
-                      </p:stCondLst>
-                      <p:childTnLst>
-                        <p:par>
-                          <p:cTn id="28" fill="hold">
-                            <p:stCondLst>
-                              <p:cond delay="0"/>
-                            </p:stCondLst>
-                            <p:childTnLst>
-                              <p:par>
-                                <p:cTn id="29" presetID="1" presetClass="entr" presetSubtype="0" fill="hold" grpId="0" nodeType="clickEffect">
-                                  <p:stCondLst>
-                                    <p:cond delay="0"/>
-                                  </p:stCondLst>
-                                  <p:childTnLst>
-                                    <p:set>
-                                      <p:cBhvr>
-                                        <p:cTn id="30" dur="1" fill="hold">
-                                          <p:stCondLst>
-                                            <p:cond delay="0"/>
-                                          </p:stCondLst>
-                                        </p:cTn>
-                                        <p:tgtEl>
-                                          <p:spTgt spid="3">
-                                            <p:txEl>
-                                              <p:pRg st="7" end="7"/>
-                                            </p:txEl>
-                                          </p:spTgt>
-                                        </p:tgtEl>
-                                        <p:attrNameLst>
-                                          <p:attrName>style.visibility</p:attrName>
-                                        </p:attrNameLst>
-                                      </p:cBhvr>
-                                      <p:to>
-                                        <p:strVal val="visible"/>
-                                      </p:to>
-                                    </p:set>
-                                  </p:childTnLst>
-                                </p:cTn>
-                              </p:par>
-                            </p:childTnLst>
-                          </p:cTn>
-                        </p:par>
-                      </p:childTnLst>
-                    </p:cTn>
-                  </p:par>
                 </p:childTnLst>
               </p:cTn>
               <p:prevCondLst>
@@ -5338,12 +5202,22 @@
           </a:xfrm>
         </p:spPr>
         <p:txBody>
-          <a:bodyPr/>
+          <a:bodyPr>
+            <a:normAutofit lnSpcReduction="10000"/>
+          </a:bodyPr>
           <a:lstStyle/>
           <a:p>
             <a:r>
               <a:rPr lang="en-US" dirty="0" smtClean="0"/>
-              <a:t>Working in a team, you need to share code</a:t>
+              <a:t>Working in a </a:t>
+            </a:r>
+            <a:r>
+              <a:rPr lang="en-US" dirty="0" smtClean="0"/>
+              <a:t>team, </a:t>
+            </a:r>
+            <a:r>
+              <a:rPr lang="en-US" dirty="0" smtClean="0"/>
+              <a:t>you need to share code</a:t>
             </a:r>
           </a:p>
           <a:p>
@@ -5409,7 +5283,18 @@
             </a:r>
             <a:r>
               <a:rPr lang="en-US" dirty="0" smtClean="0"/>
-              <a:t> not meant for code</a:t>
+              <a:t> not meant for </a:t>
+            </a:r>
+            <a:r>
+              <a:rPr lang="en-US" dirty="0" smtClean="0"/>
+              <a:t>code</a:t>
+            </a:r>
+          </a:p>
+          <a:p>
+            <a:pPr lvl="2"/>
+            <a:r>
+              <a:rPr lang="en-US" dirty="0" smtClean="0"/>
+              <a:t>No syntax highlighting, etc.</a:t>
             </a:r>
             <a:endParaRPr lang="en-US" dirty="0"/>
           </a:p>
@@ -5780,6 +5665,37 @@
                                   </p:childTnLst>
                                 </p:cTn>
                               </p:par>
+                              <p:par>
+                                <p:cTn id="29" presetID="1" presetClass="entr" presetSubtype="0" fill="hold" grpId="0" nodeType="withEffect">
+                                  <p:stCondLst>
+                                    <p:cond delay="0"/>
+                                  </p:stCondLst>
+                                  <p:childTnLst>
+                                    <p:set>
+                                      <p:cBhvr>
+                                        <p:cTn id="30" dur="1" fill="hold">
+                                          <p:stCondLst>
+                                            <p:cond delay="0"/>
+                                          </p:stCondLst>
+                                        </p:cTn>
+                                        <p:tgtEl>
+                                          <p:spTgt spid="3">
+                                            <p:txEl>
+                                              <p:pRg st="8" end="8"/>
+                                            </p:txEl>
+                                          </p:spTgt>
+                                        </p:tgtEl>
+                                        <p:attrNameLst>
+                                          <p:attrName>style.visibility</p:attrName>
+                                        </p:attrNameLst>
+                                      </p:cBhvr>
+                                      <p:to>
+                                        <p:strVal val="visible"/>
+                                      </p:to>
+                                    </p:set>
+                                  </p:childTnLst>
+                                </p:cTn>
+                              </p:par>
                             </p:childTnLst>
                           </p:cTn>
                         </p:par>
@@ -5847,10 +5763,6 @@
           <a:lstStyle/>
           <a:p>
             <a:r>
-              <a:rPr lang="en-US" dirty="0" smtClean="0"/>
-              <a:t>We’ll use </a:t>
-            </a:r>
-            <a:r>
               <a:rPr lang="en-US" dirty="0" err="1" smtClean="0"/>
               <a:t>git</a:t>
             </a:r>
@@ -5876,13 +5788,19 @@
         </p:spPr>
         <p:txBody>
           <a:bodyPr>
-            <a:normAutofit lnSpcReduction="10000"/>
+            <a:normAutofit fontScale="92500"/>
           </a:bodyPr>
           <a:lstStyle/>
           <a:p>
             <a:r>
               <a:rPr lang="en-US" dirty="0" smtClean="0"/>
-              <a:t>What does </a:t>
+              <a:t>Designed for code</a:t>
+            </a:r>
+          </a:p>
+          <a:p>
+            <a:r>
+              <a:rPr lang="en-US" dirty="0" smtClean="0"/>
+              <a:t>What </a:t>
             </a:r>
             <a:r>
               <a:rPr lang="en-US" dirty="0" err="1" smtClean="0"/>
@@ -5890,8 +5808,9 @@
             </a:r>
             <a:r>
               <a:rPr lang="en-US" dirty="0" smtClean="0"/>
-              <a:t> do for you?</a:t>
-            </a:r>
+              <a:t> does for you</a:t>
+            </a:r>
+            <a:endParaRPr lang="en-US" dirty="0" smtClean="0"/>
           </a:p>
           <a:p>
             <a:pPr lvl="1"/>
@@ -5954,15 +5873,25 @@
             <a:pPr lvl="1"/>
             <a:r>
               <a:rPr lang="en-US" dirty="0" smtClean="0"/>
-              <a:t>You’re likely to use it when you get a job</a:t>
-            </a:r>
-          </a:p>
-          <a:p>
-            <a:pPr lvl="1"/>
-            <a:r>
-              <a:rPr lang="en-US" dirty="0" smtClean="0"/>
-              <a:t>It’s free</a:t>
-            </a:r>
+              <a:t>You’ll </a:t>
+            </a:r>
+            <a:r>
+              <a:rPr lang="en-US" dirty="0" smtClean="0"/>
+              <a:t>likely </a:t>
+            </a:r>
+            <a:r>
+              <a:rPr lang="en-US" dirty="0" smtClean="0"/>
+              <a:t>use </a:t>
+            </a:r>
+            <a:r>
+              <a:rPr lang="en-US" dirty="0" smtClean="0"/>
+              <a:t>it </a:t>
+            </a:r>
+            <a:r>
+              <a:rPr lang="en-US" dirty="0" smtClean="0"/>
+              <a:t>in industry</a:t>
+            </a:r>
+            <a:endParaRPr lang="en-US" dirty="0" smtClean="0"/>
           </a:p>
           <a:p>
             <a:endParaRPr lang="en-US" dirty="0"/>
@@ -6051,6 +5980,550 @@
                                         <p:tgtEl>
                                           <p:spTgt spid="3">
                                             <p:txEl>
+                                              <p:pRg st="2" end="2"/>
+                                            </p:txEl>
+                                          </p:spTgt>
+                                        </p:tgtEl>
+                                        <p:attrNameLst>
+                                          <p:attrName>style.visibility</p:attrName>
+                                        </p:attrNameLst>
+                                      </p:cBhvr>
+                                      <p:to>
+                                        <p:strVal val="visible"/>
+                                      </p:to>
+                                    </p:set>
+                                  </p:childTnLst>
+                                </p:cTn>
+                              </p:par>
+                            </p:childTnLst>
+                          </p:cTn>
+                        </p:par>
+                      </p:childTnLst>
+                    </p:cTn>
+                  </p:par>
+                  <p:par>
+                    <p:cTn id="7" fill="hold">
+                      <p:stCondLst>
+                        <p:cond delay="indefinite"/>
+                      </p:stCondLst>
+                      <p:childTnLst>
+                        <p:par>
+                          <p:cTn id="8" fill="hold">
+                            <p:stCondLst>
+                              <p:cond delay="0"/>
+                            </p:stCondLst>
+                            <p:childTnLst>
+                              <p:par>
+                                <p:cTn id="9" presetID="1" presetClass="entr" presetSubtype="0" fill="hold" grpId="0" nodeType="clickEffect">
+                                  <p:stCondLst>
+                                    <p:cond delay="0"/>
+                                  </p:stCondLst>
+                                  <p:childTnLst>
+                                    <p:set>
+                                      <p:cBhvr>
+                                        <p:cTn id="10" dur="1" fill="hold">
+                                          <p:stCondLst>
+                                            <p:cond delay="0"/>
+                                          </p:stCondLst>
+                                        </p:cTn>
+                                        <p:tgtEl>
+                                          <p:spTgt spid="3">
+                                            <p:txEl>
+                                              <p:pRg st="3" end="3"/>
+                                            </p:txEl>
+                                          </p:spTgt>
+                                        </p:tgtEl>
+                                        <p:attrNameLst>
+                                          <p:attrName>style.visibility</p:attrName>
+                                        </p:attrNameLst>
+                                      </p:cBhvr>
+                                      <p:to>
+                                        <p:strVal val="visible"/>
+                                      </p:to>
+                                    </p:set>
+                                  </p:childTnLst>
+                                </p:cTn>
+                              </p:par>
+                            </p:childTnLst>
+                          </p:cTn>
+                        </p:par>
+                      </p:childTnLst>
+                    </p:cTn>
+                  </p:par>
+                  <p:par>
+                    <p:cTn id="11" fill="hold">
+                      <p:stCondLst>
+                        <p:cond delay="indefinite"/>
+                      </p:stCondLst>
+                      <p:childTnLst>
+                        <p:par>
+                          <p:cTn id="12" fill="hold">
+                            <p:stCondLst>
+                              <p:cond delay="0"/>
+                            </p:stCondLst>
+                            <p:childTnLst>
+                              <p:par>
+                                <p:cTn id="13" presetID="1" presetClass="entr" presetSubtype="0" fill="hold" grpId="0" nodeType="clickEffect">
+                                  <p:stCondLst>
+                                    <p:cond delay="0"/>
+                                  </p:stCondLst>
+                                  <p:childTnLst>
+                                    <p:set>
+                                      <p:cBhvr>
+                                        <p:cTn id="14" dur="1" fill="hold">
+                                          <p:stCondLst>
+                                            <p:cond delay="0"/>
+                                          </p:stCondLst>
+                                        </p:cTn>
+                                        <p:tgtEl>
+                                          <p:spTgt spid="3">
+                                            <p:txEl>
+                                              <p:pRg st="4" end="4"/>
+                                            </p:txEl>
+                                          </p:spTgt>
+                                        </p:tgtEl>
+                                        <p:attrNameLst>
+                                          <p:attrName>style.visibility</p:attrName>
+                                        </p:attrNameLst>
+                                      </p:cBhvr>
+                                      <p:to>
+                                        <p:strVal val="visible"/>
+                                      </p:to>
+                                    </p:set>
+                                  </p:childTnLst>
+                                </p:cTn>
+                              </p:par>
+                            </p:childTnLst>
+                          </p:cTn>
+                        </p:par>
+                      </p:childTnLst>
+                    </p:cTn>
+                  </p:par>
+                  <p:par>
+                    <p:cTn id="15" fill="hold">
+                      <p:stCondLst>
+                        <p:cond delay="indefinite"/>
+                      </p:stCondLst>
+                      <p:childTnLst>
+                        <p:par>
+                          <p:cTn id="16" fill="hold">
+                            <p:stCondLst>
+                              <p:cond delay="0"/>
+                            </p:stCondLst>
+                            <p:childTnLst>
+                              <p:par>
+                                <p:cTn id="17" presetID="1" presetClass="entr" presetSubtype="0" fill="hold" grpId="0" nodeType="clickEffect">
+                                  <p:stCondLst>
+                                    <p:cond delay="0"/>
+                                  </p:stCondLst>
+                                  <p:childTnLst>
+                                    <p:set>
+                                      <p:cBhvr>
+                                        <p:cTn id="18" dur="1" fill="hold">
+                                          <p:stCondLst>
+                                            <p:cond delay="0"/>
+                                          </p:stCondLst>
+                                        </p:cTn>
+                                        <p:tgtEl>
+                                          <p:spTgt spid="3">
+                                            <p:txEl>
+                                              <p:pRg st="5" end="5"/>
+                                            </p:txEl>
+                                          </p:spTgt>
+                                        </p:tgtEl>
+                                        <p:attrNameLst>
+                                          <p:attrName>style.visibility</p:attrName>
+                                        </p:attrNameLst>
+                                      </p:cBhvr>
+                                      <p:to>
+                                        <p:strVal val="visible"/>
+                                      </p:to>
+                                    </p:set>
+                                  </p:childTnLst>
+                                </p:cTn>
+                              </p:par>
+                            </p:childTnLst>
+                          </p:cTn>
+                        </p:par>
+                      </p:childTnLst>
+                    </p:cTn>
+                  </p:par>
+                  <p:par>
+                    <p:cTn id="19" fill="hold">
+                      <p:stCondLst>
+                        <p:cond delay="indefinite"/>
+                      </p:stCondLst>
+                      <p:childTnLst>
+                        <p:par>
+                          <p:cTn id="20" fill="hold">
+                            <p:stCondLst>
+                              <p:cond delay="0"/>
+                            </p:stCondLst>
+                            <p:childTnLst>
+                              <p:par>
+                                <p:cTn id="21" presetID="1" presetClass="entr" presetSubtype="0" fill="hold" grpId="0" nodeType="clickEffect">
+                                  <p:stCondLst>
+                                    <p:cond delay="0"/>
+                                  </p:stCondLst>
+                                  <p:childTnLst>
+                                    <p:set>
+                                      <p:cBhvr>
+                                        <p:cTn id="22" dur="1" fill="hold">
+                                          <p:stCondLst>
+                                            <p:cond delay="0"/>
+                                          </p:stCondLst>
+                                        </p:cTn>
+                                        <p:tgtEl>
+                                          <p:spTgt spid="3">
+                                            <p:txEl>
+                                              <p:pRg st="6" end="6"/>
+                                            </p:txEl>
+                                          </p:spTgt>
+                                        </p:tgtEl>
+                                        <p:attrNameLst>
+                                          <p:attrName>style.visibility</p:attrName>
+                                        </p:attrNameLst>
+                                      </p:cBhvr>
+                                      <p:to>
+                                        <p:strVal val="visible"/>
+                                      </p:to>
+                                    </p:set>
+                                  </p:childTnLst>
+                                </p:cTn>
+                              </p:par>
+                            </p:childTnLst>
+                          </p:cTn>
+                        </p:par>
+                      </p:childTnLst>
+                    </p:cTn>
+                  </p:par>
+                  <p:par>
+                    <p:cTn id="23" fill="hold">
+                      <p:stCondLst>
+                        <p:cond delay="indefinite"/>
+                      </p:stCondLst>
+                      <p:childTnLst>
+                        <p:par>
+                          <p:cTn id="24" fill="hold">
+                            <p:stCondLst>
+                              <p:cond delay="0"/>
+                            </p:stCondLst>
+                            <p:childTnLst>
+                              <p:par>
+                                <p:cTn id="25" presetID="1" presetClass="entr" presetSubtype="0" fill="hold" grpId="0" nodeType="clickEffect">
+                                  <p:stCondLst>
+                                    <p:cond delay="0"/>
+                                  </p:stCondLst>
+                                  <p:childTnLst>
+                                    <p:set>
+                                      <p:cBhvr>
+                                        <p:cTn id="26" dur="1" fill="hold">
+                                          <p:stCondLst>
+                                            <p:cond delay="0"/>
+                                          </p:stCondLst>
+                                        </p:cTn>
+                                        <p:tgtEl>
+                                          <p:spTgt spid="3">
+                                            <p:txEl>
+                                              <p:pRg st="7" end="7"/>
+                                            </p:txEl>
+                                          </p:spTgt>
+                                        </p:tgtEl>
+                                        <p:attrNameLst>
+                                          <p:attrName>style.visibility</p:attrName>
+                                        </p:attrNameLst>
+                                      </p:cBhvr>
+                                      <p:to>
+                                        <p:strVal val="visible"/>
+                                      </p:to>
+                                    </p:set>
+                                  </p:childTnLst>
+                                </p:cTn>
+                              </p:par>
+                            </p:childTnLst>
+                          </p:cTn>
+                        </p:par>
+                      </p:childTnLst>
+                    </p:cTn>
+                  </p:par>
+                  <p:par>
+                    <p:cTn id="27" fill="hold">
+                      <p:stCondLst>
+                        <p:cond delay="indefinite"/>
+                      </p:stCondLst>
+                      <p:childTnLst>
+                        <p:par>
+                          <p:cTn id="28" fill="hold">
+                            <p:stCondLst>
+                              <p:cond delay="0"/>
+                            </p:stCondLst>
+                            <p:childTnLst>
+                              <p:par>
+                                <p:cTn id="29" presetID="1" presetClass="entr" presetSubtype="0" fill="hold" grpId="0" nodeType="clickEffect">
+                                  <p:stCondLst>
+                                    <p:cond delay="0"/>
+                                  </p:stCondLst>
+                                  <p:childTnLst>
+                                    <p:set>
+                                      <p:cBhvr>
+                                        <p:cTn id="30" dur="1" fill="hold">
+                                          <p:stCondLst>
+                                            <p:cond delay="0"/>
+                                          </p:stCondLst>
+                                        </p:cTn>
+                                        <p:tgtEl>
+                                          <p:spTgt spid="3">
+                                            <p:txEl>
+                                              <p:pRg st="8" end="8"/>
+                                            </p:txEl>
+                                          </p:spTgt>
+                                        </p:tgtEl>
+                                        <p:attrNameLst>
+                                          <p:attrName>style.visibility</p:attrName>
+                                        </p:attrNameLst>
+                                      </p:cBhvr>
+                                      <p:to>
+                                        <p:strVal val="visible"/>
+                                      </p:to>
+                                    </p:set>
+                                  </p:childTnLst>
+                                </p:cTn>
+                              </p:par>
+                            </p:childTnLst>
+                          </p:cTn>
+                        </p:par>
+                      </p:childTnLst>
+                    </p:cTn>
+                  </p:par>
+                  <p:par>
+                    <p:cTn id="31" fill="hold">
+                      <p:stCondLst>
+                        <p:cond delay="indefinite"/>
+                      </p:stCondLst>
+                      <p:childTnLst>
+                        <p:par>
+                          <p:cTn id="32" fill="hold">
+                            <p:stCondLst>
+                              <p:cond delay="0"/>
+                            </p:stCondLst>
+                            <p:childTnLst>
+                              <p:par>
+                                <p:cTn id="33" presetID="1" presetClass="entr" presetSubtype="0" fill="hold" grpId="0" nodeType="clickEffect">
+                                  <p:stCondLst>
+                                    <p:cond delay="0"/>
+                                  </p:stCondLst>
+                                  <p:childTnLst>
+                                    <p:set>
+                                      <p:cBhvr>
+                                        <p:cTn id="34" dur="1" fill="hold">
+                                          <p:stCondLst>
+                                            <p:cond delay="0"/>
+                                          </p:stCondLst>
+                                        </p:cTn>
+                                        <p:tgtEl>
+                                          <p:spTgt spid="3">
+                                            <p:txEl>
+                                              <p:pRg st="9" end="9"/>
+                                            </p:txEl>
+                                          </p:spTgt>
+                                        </p:tgtEl>
+                                        <p:attrNameLst>
+                                          <p:attrName>style.visibility</p:attrName>
+                                        </p:attrNameLst>
+                                      </p:cBhvr>
+                                      <p:to>
+                                        <p:strVal val="visible"/>
+                                      </p:to>
+                                    </p:set>
+                                  </p:childTnLst>
+                                </p:cTn>
+                              </p:par>
+                            </p:childTnLst>
+                          </p:cTn>
+                        </p:par>
+                      </p:childTnLst>
+                    </p:cTn>
+                  </p:par>
+                </p:childTnLst>
+              </p:cTn>
+              <p:prevCondLst>
+                <p:cond evt="onPrev" delay="0">
+                  <p:tgtEl>
+                    <p:sldTgt/>
+                  </p:tgtEl>
+                </p:cond>
+              </p:prevCondLst>
+              <p:nextCondLst>
+                <p:cond evt="onNext" delay="0">
+                  <p:tgtEl>
+                    <p:sldTgt/>
+                  </p:tgtEl>
+                </p:cond>
+              </p:nextCondLst>
+            </p:seq>
+          </p:childTnLst>
+        </p:cTn>
+      </p:par>
+    </p:tnLst>
+    <p:bldLst>
+      <p:bldP spid="3" grpId="0" build="p"/>
+    </p:bldLst>
+  </p:timing>
+</p:sld>
+</file>
+
+<file path=ppt/slides/slide5.xml><?xml version="1.0" encoding="utf-8"?>
+<p:sld xmlns:a="http://schemas.openxmlformats.org/drawingml/2006/main" xmlns:r="http://schemas.openxmlformats.org/officeDocument/2006/relationships" xmlns:p="http://schemas.openxmlformats.org/presentationml/2006/main">
+  <p:cSld>
+    <p:spTree>
+      <p:nvGrpSpPr>
+        <p:cNvPr id="1" name=""/>
+        <p:cNvGrpSpPr/>
+        <p:nvPr/>
+      </p:nvGrpSpPr>
+      <p:grpSpPr>
+        <a:xfrm>
+          <a:off x="0" y="0"/>
+          <a:ext cx="0" cy="0"/>
+          <a:chOff x="0" y="0"/>
+          <a:chExt cx="0" cy="0"/>
+        </a:xfrm>
+      </p:grpSpPr>
+      <p:sp>
+        <p:nvSpPr>
+          <p:cNvPr id="2" name="Title 1"/>
+          <p:cNvSpPr>
+            <a:spLocks noGrp="1"/>
+          </p:cNvSpPr>
+          <p:nvPr>
+            <p:ph type="title"/>
+          </p:nvPr>
+        </p:nvSpPr>
+        <p:spPr/>
+        <p:txBody>
+          <a:bodyPr/>
+          <a:lstStyle/>
+          <a:p>
+            <a:r>
+              <a:rPr lang="en-US" dirty="0" err="1" smtClean="0"/>
+              <a:t>git</a:t>
+            </a:r>
+            <a:r>
+              <a:rPr lang="en-US" dirty="0" smtClean="0"/>
+              <a:t> </a:t>
+            </a:r>
+            <a:endParaRPr lang="en-US" dirty="0"/>
+          </a:p>
+        </p:txBody>
+      </p:sp>
+      <p:sp>
+        <p:nvSpPr>
+          <p:cNvPr id="3" name="Content Placeholder 2"/>
+          <p:cNvSpPr>
+            <a:spLocks noGrp="1"/>
+          </p:cNvSpPr>
+          <p:nvPr>
+            <p:ph idx="1"/>
+          </p:nvPr>
+        </p:nvSpPr>
+        <p:spPr/>
+        <p:txBody>
+          <a:bodyPr/>
+          <a:lstStyle/>
+          <a:p>
+            <a:r>
+              <a:rPr lang="en-US" dirty="0" smtClean="0"/>
+              <a:t>Version control software</a:t>
+            </a:r>
+          </a:p>
+          <a:p>
+            <a:r>
+              <a:rPr lang="en-US" dirty="0" smtClean="0"/>
+              <a:t>Remote </a:t>
+            </a:r>
+            <a:r>
+              <a:rPr lang="en-US" dirty="0" smtClean="0"/>
+              <a:t>server hosts your repository</a:t>
+            </a:r>
+          </a:p>
+          <a:p>
+            <a:r>
+              <a:rPr lang="en-US" dirty="0" smtClean="0"/>
+              <a:t>Every </a:t>
+            </a:r>
+            <a:r>
+              <a:rPr lang="en-US" dirty="0"/>
+              <a:t>user maintains a local copy of the entire </a:t>
+            </a:r>
+            <a:r>
+              <a:rPr lang="en-US" dirty="0" smtClean="0"/>
+              <a:t>repository</a:t>
+            </a:r>
+            <a:endParaRPr lang="en-US" dirty="0" smtClean="0"/>
+          </a:p>
+          <a:p>
+            <a:r>
+              <a:rPr lang="en-US" dirty="0" smtClean="0"/>
+              <a:t>Need to install </a:t>
+            </a:r>
+            <a:r>
+              <a:rPr lang="en-US" dirty="0" err="1" smtClean="0"/>
+              <a:t>git</a:t>
+            </a:r>
+            <a:r>
+              <a:rPr lang="en-US" dirty="0" smtClean="0"/>
+              <a:t> if it doesn’t come with your OS</a:t>
+            </a:r>
+            <a:endParaRPr lang="en-US" dirty="0"/>
+          </a:p>
+        </p:txBody>
+      </p:sp>
+    </p:spTree>
+    <p:extLst>
+      <p:ext uri="{BB962C8B-B14F-4D97-AF65-F5344CB8AC3E}">
+        <p14:creationId xmlns:p14="http://schemas.microsoft.com/office/powerpoint/2010/main" val="70751729"/>
+      </p:ext>
+    </p:extLst>
+  </p:cSld>
+  <p:clrMapOvr>
+    <a:masterClrMapping/>
+  </p:clrMapOvr>
+  <p:timing>
+    <p:tnLst>
+      <p:par>
+        <p:cTn xmlns:p14="http://schemas.microsoft.com/office/powerpoint/2010/main" id="1" dur="indefinite" restart="never" nodeType="tmRoot">
+          <p:childTnLst>
+            <p:seq concurrent="1" nextAc="seek">
+              <p:cTn id="2" dur="indefinite" nodeType="mainSeq">
+                <p:childTnLst>
+                  <p:par>
+                    <p:cTn id="3" fill="hold">
+                      <p:stCondLst>
+                        <p:cond delay="indefinite"/>
+                      </p:stCondLst>
+                      <p:childTnLst>
+                        <p:par>
+                          <p:cTn id="4" fill="hold">
+                            <p:stCondLst>
+                              <p:cond delay="0"/>
+                            </p:stCondLst>
+                            <p:childTnLst>
+                              <p:par>
+                                <p:cTn id="5" presetID="1" presetClass="entr" presetSubtype="0" fill="hold" grpId="0" nodeType="clickEffect">
+                                  <p:stCondLst>
+                                    <p:cond delay="0"/>
+                                  </p:stCondLst>
+                                  <p:childTnLst>
+                                    <p:set>
+                                      <p:cBhvr>
+                                        <p:cTn id="6" dur="1" fill="hold">
+                                          <p:stCondLst>
+                                            <p:cond delay="0"/>
+                                          </p:stCondLst>
+                                        </p:cTn>
+                                        <p:tgtEl>
+                                          <p:spTgt spid="3">
+                                            <p:txEl>
                                               <p:pRg st="1" end="1"/>
                                             </p:txEl>
                                           </p:spTgt>
@@ -6086,6 +6559,439 @@
                             <p:childTnLst>
                               <p:par>
                                 <p:cTn id="9" presetID="1" presetClass="entr" presetSubtype="0" fill="hold" grpId="0" nodeType="clickEffect">
+                                  <p:stCondLst>
+                                    <p:cond delay="0"/>
+                                  </p:stCondLst>
+                                  <p:childTnLst>
+                                    <p:set>
+                                      <p:cBhvr>
+                                        <p:cTn id="10" dur="1" fill="hold">
+                                          <p:stCondLst>
+                                            <p:cond delay="0"/>
+                                          </p:stCondLst>
+                                        </p:cTn>
+                                        <p:tgtEl>
+                                          <p:spTgt spid="3">
+                                            <p:txEl>
+                                              <p:pRg st="2" end="2"/>
+                                            </p:txEl>
+                                          </p:spTgt>
+                                        </p:tgtEl>
+                                        <p:attrNameLst>
+                                          <p:attrName>style.visibility</p:attrName>
+                                        </p:attrNameLst>
+                                      </p:cBhvr>
+                                      <p:to>
+                                        <p:strVal val="visible"/>
+                                      </p:to>
+                                    </p:set>
+                                  </p:childTnLst>
+                                </p:cTn>
+                              </p:par>
+                            </p:childTnLst>
+                          </p:cTn>
+                        </p:par>
+                      </p:childTnLst>
+                    </p:cTn>
+                  </p:par>
+                  <p:par>
+                    <p:cTn id="11" fill="hold">
+                      <p:stCondLst>
+                        <p:cond delay="indefinite"/>
+                      </p:stCondLst>
+                      <p:childTnLst>
+                        <p:par>
+                          <p:cTn id="12" fill="hold">
+                            <p:stCondLst>
+                              <p:cond delay="0"/>
+                            </p:stCondLst>
+                            <p:childTnLst>
+                              <p:par>
+                                <p:cTn id="13" presetID="1" presetClass="entr" presetSubtype="0" fill="hold" grpId="0" nodeType="clickEffect">
+                                  <p:stCondLst>
+                                    <p:cond delay="0"/>
+                                  </p:stCondLst>
+                                  <p:childTnLst>
+                                    <p:set>
+                                      <p:cBhvr>
+                                        <p:cTn id="14" dur="1" fill="hold">
+                                          <p:stCondLst>
+                                            <p:cond delay="0"/>
+                                          </p:stCondLst>
+                                        </p:cTn>
+                                        <p:tgtEl>
+                                          <p:spTgt spid="3">
+                                            <p:txEl>
+                                              <p:pRg st="3" end="3"/>
+                                            </p:txEl>
+                                          </p:spTgt>
+                                        </p:tgtEl>
+                                        <p:attrNameLst>
+                                          <p:attrName>style.visibility</p:attrName>
+                                        </p:attrNameLst>
+                                      </p:cBhvr>
+                                      <p:to>
+                                        <p:strVal val="visible"/>
+                                      </p:to>
+                                    </p:set>
+                                  </p:childTnLst>
+                                </p:cTn>
+                              </p:par>
+                            </p:childTnLst>
+                          </p:cTn>
+                        </p:par>
+                      </p:childTnLst>
+                    </p:cTn>
+                  </p:par>
+                </p:childTnLst>
+              </p:cTn>
+              <p:prevCondLst>
+                <p:cond evt="onPrev" delay="0">
+                  <p:tgtEl>
+                    <p:sldTgt/>
+                  </p:tgtEl>
+                </p:cond>
+              </p:prevCondLst>
+              <p:nextCondLst>
+                <p:cond evt="onNext" delay="0">
+                  <p:tgtEl>
+                    <p:sldTgt/>
+                  </p:tgtEl>
+                </p:cond>
+              </p:nextCondLst>
+            </p:seq>
+          </p:childTnLst>
+        </p:cTn>
+      </p:par>
+    </p:tnLst>
+    <p:bldLst>
+      <p:bldP spid="3" grpId="0" build="p"/>
+    </p:bldLst>
+  </p:timing>
+</p:sld>
+</file>
+
+<file path=ppt/slides/slide6.xml><?xml version="1.0" encoding="utf-8"?>
+<p:sld xmlns:a="http://schemas.openxmlformats.org/drawingml/2006/main" xmlns:r="http://schemas.openxmlformats.org/officeDocument/2006/relationships" xmlns:p="http://schemas.openxmlformats.org/presentationml/2006/main">
+  <p:cSld>
+    <p:spTree>
+      <p:nvGrpSpPr>
+        <p:cNvPr id="1" name=""/>
+        <p:cNvGrpSpPr/>
+        <p:nvPr/>
+      </p:nvGrpSpPr>
+      <p:grpSpPr>
+        <a:xfrm>
+          <a:off x="0" y="0"/>
+          <a:ext cx="0" cy="0"/>
+          <a:chOff x="0" y="0"/>
+          <a:chExt cx="0" cy="0"/>
+        </a:xfrm>
+      </p:grpSpPr>
+      <p:sp>
+        <p:nvSpPr>
+          <p:cNvPr id="2" name="Title 1"/>
+          <p:cNvSpPr>
+            <a:spLocks noGrp="1"/>
+          </p:cNvSpPr>
+          <p:nvPr>
+            <p:ph type="title"/>
+          </p:nvPr>
+        </p:nvSpPr>
+        <p:spPr/>
+        <p:txBody>
+          <a:bodyPr/>
+          <a:lstStyle/>
+          <a:p>
+            <a:r>
+              <a:rPr lang="en-US" dirty="0" err="1"/>
+              <a:t>g</a:t>
+            </a:r>
+            <a:r>
+              <a:rPr lang="en-US" dirty="0" err="1" smtClean="0"/>
+              <a:t>it</a:t>
+            </a:r>
+            <a:r>
+              <a:rPr lang="en-US" dirty="0" smtClean="0"/>
+              <a:t> is..</a:t>
+            </a:r>
+            <a:endParaRPr lang="en-US" dirty="0"/>
+          </a:p>
+        </p:txBody>
+      </p:sp>
+      <p:pic>
+        <p:nvPicPr>
+          <p:cNvPr id="4" name="Picture 3">
+            <a:hlinkClick r:id="rId2"/>
+          </p:cNvPr>
+          <p:cNvPicPr>
+            <a:picLocks noChangeAspect="1"/>
+          </p:cNvPicPr>
+          <p:nvPr/>
+        </p:nvPicPr>
+        <p:blipFill>
+          <a:blip r:embed="rId3"/>
+          <a:stretch>
+            <a:fillRect/>
+          </a:stretch>
+        </p:blipFill>
+        <p:spPr>
+          <a:xfrm>
+            <a:off x="1316923" y="1417638"/>
+            <a:ext cx="6302423" cy="4851505"/>
+          </a:xfrm>
+          <a:prstGeom prst="rect">
+            <a:avLst/>
+          </a:prstGeom>
+        </p:spPr>
+      </p:pic>
+    </p:spTree>
+    <p:extLst>
+      <p:ext uri="{BB962C8B-B14F-4D97-AF65-F5344CB8AC3E}">
+        <p14:creationId xmlns:p14="http://schemas.microsoft.com/office/powerpoint/2010/main" val="3415646396"/>
+      </p:ext>
+    </p:extLst>
+  </p:cSld>
+  <p:clrMapOvr>
+    <a:masterClrMapping/>
+  </p:clrMapOvr>
+  <p:timing>
+    <p:tnLst>
+      <p:par>
+        <p:cTn xmlns:p14="http://schemas.microsoft.com/office/powerpoint/2010/main" id="1" dur="indefinite" restart="never" nodeType="tmRoot"/>
+      </p:par>
+    </p:tnLst>
+  </p:timing>
+</p:sld>
+</file>
+
+<file path=ppt/slides/slide7.xml><?xml version="1.0" encoding="utf-8"?>
+<p:sld xmlns:a="http://schemas.openxmlformats.org/drawingml/2006/main" xmlns:r="http://schemas.openxmlformats.org/officeDocument/2006/relationships" xmlns:p="http://schemas.openxmlformats.org/presentationml/2006/main">
+  <p:cSld>
+    <p:spTree>
+      <p:nvGrpSpPr>
+        <p:cNvPr id="1" name=""/>
+        <p:cNvGrpSpPr/>
+        <p:nvPr/>
+      </p:nvGrpSpPr>
+      <p:grpSpPr>
+        <a:xfrm>
+          <a:off x="0" y="0"/>
+          <a:ext cx="0" cy="0"/>
+          <a:chOff x="0" y="0"/>
+          <a:chExt cx="0" cy="0"/>
+        </a:xfrm>
+      </p:grpSpPr>
+      <p:sp>
+        <p:nvSpPr>
+          <p:cNvPr id="2" name="Title 1"/>
+          <p:cNvSpPr>
+            <a:spLocks noGrp="1"/>
+          </p:cNvSpPr>
+          <p:nvPr>
+            <p:ph type="title"/>
+          </p:nvPr>
+        </p:nvSpPr>
+        <p:spPr/>
+        <p:txBody>
+          <a:bodyPr/>
+          <a:lstStyle/>
+          <a:p>
+            <a:r>
+              <a:rPr lang="en-US" dirty="0" smtClean="0"/>
+              <a:t>Scenario</a:t>
+            </a:r>
+            <a:endParaRPr lang="en-US" dirty="0"/>
+          </a:p>
+        </p:txBody>
+      </p:sp>
+      <p:sp>
+        <p:nvSpPr>
+          <p:cNvPr id="3" name="Content Placeholder 2"/>
+          <p:cNvSpPr>
+            <a:spLocks noGrp="1"/>
+          </p:cNvSpPr>
+          <p:nvPr>
+            <p:ph idx="1"/>
+          </p:nvPr>
+        </p:nvSpPr>
+        <p:spPr>
+          <a:xfrm>
+            <a:off x="457200" y="1600200"/>
+            <a:ext cx="8229600" cy="4870760"/>
+          </a:xfrm>
+        </p:spPr>
+        <p:txBody>
+          <a:bodyPr>
+            <a:normAutofit/>
+          </a:bodyPr>
+          <a:lstStyle/>
+          <a:p>
+            <a:pPr marL="342900" lvl="1" indent="-342900">
+              <a:buFont typeface="Arial"/>
+              <a:buChar char="•"/>
+            </a:pPr>
+            <a:r>
+              <a:rPr lang="en-US" sz="3200" dirty="0" smtClean="0"/>
+              <a:t>Bob writes </a:t>
+            </a:r>
+            <a:r>
+              <a:rPr lang="en-US" sz="3200" dirty="0"/>
+              <a:t>a bug just before </a:t>
+            </a:r>
+            <a:r>
+              <a:rPr lang="en-US" sz="3200" dirty="0" smtClean="0"/>
+              <a:t>a big release</a:t>
+            </a:r>
+          </a:p>
+          <a:p>
+            <a:r>
+              <a:rPr lang="en-US" dirty="0" smtClean="0"/>
+              <a:t>With poor version </a:t>
+            </a:r>
+            <a:r>
+              <a:rPr lang="en-US" dirty="0" smtClean="0"/>
+              <a:t>control</a:t>
+            </a:r>
+          </a:p>
+          <a:p>
+            <a:pPr lvl="1"/>
+            <a:r>
+              <a:rPr lang="en-US" dirty="0" smtClean="0"/>
+              <a:t>The customer sees the bug</a:t>
+            </a:r>
+            <a:endParaRPr lang="en-US" dirty="0" smtClean="0"/>
+          </a:p>
+          <a:p>
+            <a:pPr lvl="1"/>
+            <a:r>
+              <a:rPr lang="en-US" dirty="0" smtClean="0"/>
+              <a:t>The customer is not happy</a:t>
+            </a:r>
+          </a:p>
+          <a:p>
+            <a:r>
+              <a:rPr lang="en-US" dirty="0" smtClean="0"/>
+              <a:t>With proper version control</a:t>
+            </a:r>
+          </a:p>
+          <a:p>
+            <a:pPr lvl="1"/>
+            <a:r>
+              <a:rPr lang="en-US" dirty="0" smtClean="0"/>
+              <a:t>Bob </a:t>
+            </a:r>
+            <a:r>
+              <a:rPr lang="en-US" dirty="0" smtClean="0"/>
+              <a:t>pushes </a:t>
+            </a:r>
+            <a:r>
+              <a:rPr lang="en-US" dirty="0" smtClean="0"/>
+              <a:t>his changes</a:t>
+            </a:r>
+          </a:p>
+          <a:p>
+            <a:pPr lvl="1"/>
+            <a:r>
+              <a:rPr lang="en-US" dirty="0" smtClean="0"/>
+              <a:t>The team notices the bug and reverts Bob’s commit</a:t>
+            </a:r>
+            <a:endParaRPr lang="en-US" dirty="0" smtClean="0"/>
+          </a:p>
+          <a:p>
+            <a:pPr lvl="1"/>
+            <a:r>
+              <a:rPr lang="en-US" dirty="0" smtClean="0"/>
+              <a:t>Customer </a:t>
+            </a:r>
+            <a:r>
+              <a:rPr lang="en-US" dirty="0" smtClean="0"/>
+              <a:t>never sees the bug</a:t>
+            </a:r>
+          </a:p>
+        </p:txBody>
+      </p:sp>
+    </p:spTree>
+    <p:extLst>
+      <p:ext uri="{BB962C8B-B14F-4D97-AF65-F5344CB8AC3E}">
+        <p14:creationId xmlns:p14="http://schemas.microsoft.com/office/powerpoint/2010/main" val="2774756018"/>
+      </p:ext>
+    </p:extLst>
+  </p:cSld>
+  <p:clrMapOvr>
+    <a:masterClrMapping/>
+  </p:clrMapOvr>
+  <p:timing>
+    <p:tnLst>
+      <p:par>
+        <p:cTn xmlns:p14="http://schemas.microsoft.com/office/powerpoint/2010/main" id="1" dur="indefinite" restart="never" nodeType="tmRoot">
+          <p:childTnLst>
+            <p:seq concurrent="1" nextAc="seek">
+              <p:cTn id="2" dur="indefinite" nodeType="mainSeq">
+                <p:childTnLst>
+                  <p:par>
+                    <p:cTn id="3" fill="hold">
+                      <p:stCondLst>
+                        <p:cond delay="indefinite"/>
+                      </p:stCondLst>
+                      <p:childTnLst>
+                        <p:par>
+                          <p:cTn id="4" fill="hold">
+                            <p:stCondLst>
+                              <p:cond delay="0"/>
+                            </p:stCondLst>
+                            <p:childTnLst>
+                              <p:par>
+                                <p:cTn id="5" presetID="1" presetClass="entr" presetSubtype="0" fill="hold" nodeType="clickEffect">
+                                  <p:stCondLst>
+                                    <p:cond delay="0"/>
+                                  </p:stCondLst>
+                                  <p:childTnLst>
+                                    <p:set>
+                                      <p:cBhvr>
+                                        <p:cTn id="6" dur="1" fill="hold">
+                                          <p:stCondLst>
+                                            <p:cond delay="0"/>
+                                          </p:stCondLst>
+                                        </p:cTn>
+                                        <p:tgtEl>
+                                          <p:spTgt spid="3">
+                                            <p:txEl>
+                                              <p:pRg st="1" end="1"/>
+                                            </p:txEl>
+                                          </p:spTgt>
+                                        </p:tgtEl>
+                                        <p:attrNameLst>
+                                          <p:attrName>style.visibility</p:attrName>
+                                        </p:attrNameLst>
+                                      </p:cBhvr>
+                                      <p:to>
+                                        <p:strVal val="visible"/>
+                                      </p:to>
+                                    </p:set>
+                                  </p:childTnLst>
+                                </p:cTn>
+                              </p:par>
+                            </p:childTnLst>
+                          </p:cTn>
+                        </p:par>
+                      </p:childTnLst>
+                    </p:cTn>
+                  </p:par>
+                  <p:par>
+                    <p:cTn id="7" fill="hold">
+                      <p:stCondLst>
+                        <p:cond delay="indefinite"/>
+                      </p:stCondLst>
+                      <p:childTnLst>
+                        <p:par>
+                          <p:cTn id="8" fill="hold">
+                            <p:stCondLst>
+                              <p:cond delay="0"/>
+                            </p:stCondLst>
+                            <p:childTnLst>
+                              <p:par>
+                                <p:cTn id="9" presetID="1" presetClass="entr" presetSubtype="0" fill="hold" nodeType="clickEffect">
                                   <p:stCondLst>
                                     <p:cond delay="0"/>
                                   </p:stCondLst>
@@ -6262,33 +7168,15 @@
                                   </p:childTnLst>
                                 </p:cTn>
                               </p:par>
-                            </p:childTnLst>
-                          </p:cTn>
-                        </p:par>
-                      </p:childTnLst>
-                    </p:cTn>
-                  </p:par>
-                  <p:par>
-                    <p:cTn id="23" fill="hold">
-                      <p:stCondLst>
-                        <p:cond delay="indefinite"/>
-                      </p:stCondLst>
-                      <p:childTnLst>
-                        <p:par>
-                          <p:cTn id="24" fill="hold">
-                            <p:stCondLst>
-                              <p:cond delay="0"/>
-                            </p:stCondLst>
-                            <p:childTnLst>
                               <p:par>
-                                <p:cTn id="25" presetID="1" presetClass="entr" presetSubtype="0" fill="hold" grpId="0" nodeType="clickEffect">
+                                <p:cTn id="23" presetID="1" presetClass="entr" presetSubtype="0" fill="hold" grpId="0" nodeType="withEffect">
                                   <p:stCondLst>
                                     <p:cond delay="0"/>
                                   </p:stCondLst>
                                   <p:childTnLst>
                                     <p:set>
                                       <p:cBhvr>
-                                        <p:cTn id="26" dur="1" fill="hold">
+                                        <p:cTn id="24" dur="1" fill="hold">
                                           <p:stCondLst>
                                             <p:cond delay="0"/>
                                           </p:stCondLst>
@@ -6318,1085 +7206,26 @@
                     </p:cTn>
                   </p:par>
                   <p:par>
-                    <p:cTn id="27" fill="hold">
+                    <p:cTn id="25" fill="hold">
                       <p:stCondLst>
                         <p:cond delay="indefinite"/>
                       </p:stCondLst>
                       <p:childTnLst>
                         <p:par>
-                          <p:cTn id="28" fill="hold">
+                          <p:cTn id="26" fill="hold">
                             <p:stCondLst>
                               <p:cond delay="0"/>
                             </p:stCondLst>
                             <p:childTnLst>
                               <p:par>
-                                <p:cTn id="29" presetID="1" presetClass="entr" presetSubtype="0" fill="hold" grpId="0" nodeType="clickEffect">
+                                <p:cTn id="27" presetID="1" presetClass="entr" presetSubtype="0" fill="hold" grpId="0" nodeType="clickEffect">
                                   <p:stCondLst>
                                     <p:cond delay="0"/>
                                   </p:stCondLst>
                                   <p:childTnLst>
                                     <p:set>
                                       <p:cBhvr>
-                                        <p:cTn id="30" dur="1" fill="hold">
-                                          <p:stCondLst>
-                                            <p:cond delay="0"/>
-                                          </p:stCondLst>
-                                        </p:cTn>
-                                        <p:tgtEl>
-                                          <p:spTgt spid="3">
-                                            <p:txEl>
-                                              <p:pRg st="7" end="7"/>
-                                            </p:txEl>
-                                          </p:spTgt>
-                                        </p:tgtEl>
-                                        <p:attrNameLst>
-                                          <p:attrName>style.visibility</p:attrName>
-                                        </p:attrNameLst>
-                                      </p:cBhvr>
-                                      <p:to>
-                                        <p:strVal val="visible"/>
-                                      </p:to>
-                                    </p:set>
-                                  </p:childTnLst>
-                                </p:cTn>
-                              </p:par>
-                            </p:childTnLst>
-                          </p:cTn>
-                        </p:par>
-                      </p:childTnLst>
-                    </p:cTn>
-                  </p:par>
-                  <p:par>
-                    <p:cTn id="31" fill="hold">
-                      <p:stCondLst>
-                        <p:cond delay="indefinite"/>
-                      </p:stCondLst>
-                      <p:childTnLst>
-                        <p:par>
-                          <p:cTn id="32" fill="hold">
-                            <p:stCondLst>
-                              <p:cond delay="0"/>
-                            </p:stCondLst>
-                            <p:childTnLst>
-                              <p:par>
-                                <p:cTn id="33" presetID="1" presetClass="entr" presetSubtype="0" fill="hold" grpId="0" nodeType="clickEffect">
-                                  <p:stCondLst>
-                                    <p:cond delay="0"/>
-                                  </p:stCondLst>
-                                  <p:childTnLst>
-                                    <p:set>
-                                      <p:cBhvr>
-                                        <p:cTn id="34" dur="1" fill="hold">
-                                          <p:stCondLst>
-                                            <p:cond delay="0"/>
-                                          </p:stCondLst>
-                                        </p:cTn>
-                                        <p:tgtEl>
-                                          <p:spTgt spid="3">
-                                            <p:txEl>
-                                              <p:pRg st="8" end="8"/>
-                                            </p:txEl>
-                                          </p:spTgt>
-                                        </p:tgtEl>
-                                        <p:attrNameLst>
-                                          <p:attrName>style.visibility</p:attrName>
-                                        </p:attrNameLst>
-                                      </p:cBhvr>
-                                      <p:to>
-                                        <p:strVal val="visible"/>
-                                      </p:to>
-                                    </p:set>
-                                  </p:childTnLst>
-                                </p:cTn>
-                              </p:par>
-                            </p:childTnLst>
-                          </p:cTn>
-                        </p:par>
-                      </p:childTnLst>
-                    </p:cTn>
-                  </p:par>
-                  <p:par>
-                    <p:cTn id="35" fill="hold">
-                      <p:stCondLst>
-                        <p:cond delay="indefinite"/>
-                      </p:stCondLst>
-                      <p:childTnLst>
-                        <p:par>
-                          <p:cTn id="36" fill="hold">
-                            <p:stCondLst>
-                              <p:cond delay="0"/>
-                            </p:stCondLst>
-                            <p:childTnLst>
-                              <p:par>
-                                <p:cTn id="37" presetID="1" presetClass="entr" presetSubtype="0" fill="hold" grpId="0" nodeType="clickEffect">
-                                  <p:stCondLst>
-                                    <p:cond delay="0"/>
-                                  </p:stCondLst>
-                                  <p:childTnLst>
-                                    <p:set>
-                                      <p:cBhvr>
-                                        <p:cTn id="38" dur="1" fill="hold">
-                                          <p:stCondLst>
-                                            <p:cond delay="0"/>
-                                          </p:stCondLst>
-                                        </p:cTn>
-                                        <p:tgtEl>
-                                          <p:spTgt spid="3">
-                                            <p:txEl>
-                                              <p:pRg st="9" end="9"/>
-                                            </p:txEl>
-                                          </p:spTgt>
-                                        </p:tgtEl>
-                                        <p:attrNameLst>
-                                          <p:attrName>style.visibility</p:attrName>
-                                        </p:attrNameLst>
-                                      </p:cBhvr>
-                                      <p:to>
-                                        <p:strVal val="visible"/>
-                                      </p:to>
-                                    </p:set>
-                                  </p:childTnLst>
-                                </p:cTn>
-                              </p:par>
-                            </p:childTnLst>
-                          </p:cTn>
-                        </p:par>
-                      </p:childTnLst>
-                    </p:cTn>
-                  </p:par>
-                </p:childTnLst>
-              </p:cTn>
-              <p:prevCondLst>
-                <p:cond evt="onPrev" delay="0">
-                  <p:tgtEl>
-                    <p:sldTgt/>
-                  </p:tgtEl>
-                </p:cond>
-              </p:prevCondLst>
-              <p:nextCondLst>
-                <p:cond evt="onNext" delay="0">
-                  <p:tgtEl>
-                    <p:sldTgt/>
-                  </p:tgtEl>
-                </p:cond>
-              </p:nextCondLst>
-            </p:seq>
-          </p:childTnLst>
-        </p:cTn>
-      </p:par>
-    </p:tnLst>
-    <p:bldLst>
-      <p:bldP spid="3" grpId="0" build="p"/>
-    </p:bldLst>
-  </p:timing>
-</p:sld>
-</file>
-
-<file path=ppt/slides/slide5.xml><?xml version="1.0" encoding="utf-8"?>
-<p:sld xmlns:a="http://schemas.openxmlformats.org/drawingml/2006/main" xmlns:r="http://schemas.openxmlformats.org/officeDocument/2006/relationships" xmlns:p="http://schemas.openxmlformats.org/presentationml/2006/main">
-  <p:cSld>
-    <p:spTree>
-      <p:nvGrpSpPr>
-        <p:cNvPr id="1" name=""/>
-        <p:cNvGrpSpPr/>
-        <p:nvPr/>
-      </p:nvGrpSpPr>
-      <p:grpSpPr>
-        <a:xfrm>
-          <a:off x="0" y="0"/>
-          <a:ext cx="0" cy="0"/>
-          <a:chOff x="0" y="0"/>
-          <a:chExt cx="0" cy="0"/>
-        </a:xfrm>
-      </p:grpSpPr>
-      <p:sp>
-        <p:nvSpPr>
-          <p:cNvPr id="2" name="Title 1"/>
-          <p:cNvSpPr>
-            <a:spLocks noGrp="1"/>
-          </p:cNvSpPr>
-          <p:nvPr>
-            <p:ph type="title"/>
-          </p:nvPr>
-        </p:nvSpPr>
-        <p:spPr/>
-        <p:txBody>
-          <a:bodyPr/>
-          <a:lstStyle/>
-          <a:p>
-            <a:r>
-              <a:rPr lang="en-US" dirty="0" err="1" smtClean="0"/>
-              <a:t>git</a:t>
-            </a:r>
-            <a:r>
-              <a:rPr lang="en-US" dirty="0" smtClean="0"/>
-              <a:t> </a:t>
-            </a:r>
-            <a:endParaRPr lang="en-US" dirty="0"/>
-          </a:p>
-        </p:txBody>
-      </p:sp>
-      <p:sp>
-        <p:nvSpPr>
-          <p:cNvPr id="3" name="Content Placeholder 2"/>
-          <p:cNvSpPr>
-            <a:spLocks noGrp="1"/>
-          </p:cNvSpPr>
-          <p:nvPr>
-            <p:ph idx="1"/>
-          </p:nvPr>
-        </p:nvSpPr>
-        <p:spPr/>
-        <p:txBody>
-          <a:bodyPr/>
-          <a:lstStyle/>
-          <a:p>
-            <a:r>
-              <a:rPr lang="en-US" dirty="0" smtClean="0"/>
-              <a:t>Version control software</a:t>
-            </a:r>
-          </a:p>
-          <a:p>
-            <a:pPr lvl="1"/>
-            <a:r>
-              <a:rPr lang="en-US" dirty="0" smtClean="0"/>
-              <a:t>Linux/Linus</a:t>
-            </a:r>
-          </a:p>
-          <a:p>
-            <a:r>
-              <a:rPr lang="en-US" dirty="0" smtClean="0"/>
-              <a:t>Remote server hosts your repository</a:t>
-            </a:r>
-          </a:p>
-          <a:p>
-            <a:r>
-              <a:rPr lang="en-US" dirty="0" smtClean="0"/>
-              <a:t>Every </a:t>
-            </a:r>
-            <a:r>
-              <a:rPr lang="en-US" dirty="0"/>
-              <a:t>user maintains a local copy of the entire </a:t>
-            </a:r>
-            <a:r>
-              <a:rPr lang="en-US" dirty="0" smtClean="0"/>
-              <a:t>repos</a:t>
-            </a:r>
-          </a:p>
-          <a:p>
-            <a:r>
-              <a:rPr lang="en-US" dirty="0" smtClean="0"/>
-              <a:t>Need to install </a:t>
-            </a:r>
-            <a:r>
-              <a:rPr lang="en-US" dirty="0" err="1" smtClean="0"/>
-              <a:t>git</a:t>
-            </a:r>
-            <a:r>
-              <a:rPr lang="en-US" dirty="0" smtClean="0"/>
-              <a:t> if it doesn’t come with your OS</a:t>
-            </a:r>
-            <a:endParaRPr lang="en-US" dirty="0"/>
-          </a:p>
-        </p:txBody>
-      </p:sp>
-    </p:spTree>
-    <p:extLst>
-      <p:ext uri="{BB962C8B-B14F-4D97-AF65-F5344CB8AC3E}">
-        <p14:creationId xmlns:p14="http://schemas.microsoft.com/office/powerpoint/2010/main" val="70751729"/>
-      </p:ext>
-    </p:extLst>
-  </p:cSld>
-  <p:clrMapOvr>
-    <a:masterClrMapping/>
-  </p:clrMapOvr>
-  <p:timing>
-    <p:tnLst>
-      <p:par>
-        <p:cTn xmlns:p14="http://schemas.microsoft.com/office/powerpoint/2010/main" id="1" dur="indefinite" restart="never" nodeType="tmRoot">
-          <p:childTnLst>
-            <p:seq concurrent="1" nextAc="seek">
-              <p:cTn id="2" dur="indefinite" nodeType="mainSeq">
-                <p:childTnLst>
-                  <p:par>
-                    <p:cTn id="3" fill="hold">
-                      <p:stCondLst>
-                        <p:cond delay="indefinite"/>
-                      </p:stCondLst>
-                      <p:childTnLst>
-                        <p:par>
-                          <p:cTn id="4" fill="hold">
-                            <p:stCondLst>
-                              <p:cond delay="0"/>
-                            </p:stCondLst>
-                            <p:childTnLst>
-                              <p:par>
-                                <p:cTn id="5" presetID="1" presetClass="entr" presetSubtype="0" fill="hold" grpId="0" nodeType="clickEffect">
-                                  <p:stCondLst>
-                                    <p:cond delay="0"/>
-                                  </p:stCondLst>
-                                  <p:childTnLst>
-                                    <p:set>
-                                      <p:cBhvr>
-                                        <p:cTn id="6" dur="1" fill="hold">
-                                          <p:stCondLst>
-                                            <p:cond delay="0"/>
-                                          </p:stCondLst>
-                                        </p:cTn>
-                                        <p:tgtEl>
-                                          <p:spTgt spid="3">
-                                            <p:txEl>
-                                              <p:pRg st="1" end="1"/>
-                                            </p:txEl>
-                                          </p:spTgt>
-                                        </p:tgtEl>
-                                        <p:attrNameLst>
-                                          <p:attrName>style.visibility</p:attrName>
-                                        </p:attrNameLst>
-                                      </p:cBhvr>
-                                      <p:to>
-                                        <p:strVal val="visible"/>
-                                      </p:to>
-                                    </p:set>
-                                  </p:childTnLst>
-                                </p:cTn>
-                              </p:par>
-                            </p:childTnLst>
-                          </p:cTn>
-                        </p:par>
-                      </p:childTnLst>
-                    </p:cTn>
-                  </p:par>
-                  <p:par>
-                    <p:cTn id="7" fill="hold">
-                      <p:stCondLst>
-                        <p:cond delay="indefinite"/>
-                      </p:stCondLst>
-                      <p:childTnLst>
-                        <p:par>
-                          <p:cTn id="8" fill="hold">
-                            <p:stCondLst>
-                              <p:cond delay="0"/>
-                            </p:stCondLst>
-                            <p:childTnLst>
-                              <p:par>
-                                <p:cTn id="9" presetID="1" presetClass="entr" presetSubtype="0" fill="hold" grpId="0" nodeType="clickEffect">
-                                  <p:stCondLst>
-                                    <p:cond delay="0"/>
-                                  </p:stCondLst>
-                                  <p:childTnLst>
-                                    <p:set>
-                                      <p:cBhvr>
-                                        <p:cTn id="10" dur="1" fill="hold">
-                                          <p:stCondLst>
-                                            <p:cond delay="0"/>
-                                          </p:stCondLst>
-                                        </p:cTn>
-                                        <p:tgtEl>
-                                          <p:spTgt spid="3">
-                                            <p:txEl>
-                                              <p:pRg st="2" end="2"/>
-                                            </p:txEl>
-                                          </p:spTgt>
-                                        </p:tgtEl>
-                                        <p:attrNameLst>
-                                          <p:attrName>style.visibility</p:attrName>
-                                        </p:attrNameLst>
-                                      </p:cBhvr>
-                                      <p:to>
-                                        <p:strVal val="visible"/>
-                                      </p:to>
-                                    </p:set>
-                                  </p:childTnLst>
-                                </p:cTn>
-                              </p:par>
-                            </p:childTnLst>
-                          </p:cTn>
-                        </p:par>
-                      </p:childTnLst>
-                    </p:cTn>
-                  </p:par>
-                  <p:par>
-                    <p:cTn id="11" fill="hold">
-                      <p:stCondLst>
-                        <p:cond delay="indefinite"/>
-                      </p:stCondLst>
-                      <p:childTnLst>
-                        <p:par>
-                          <p:cTn id="12" fill="hold">
-                            <p:stCondLst>
-                              <p:cond delay="0"/>
-                            </p:stCondLst>
-                            <p:childTnLst>
-                              <p:par>
-                                <p:cTn id="13" presetID="1" presetClass="entr" presetSubtype="0" fill="hold" grpId="0" nodeType="clickEffect">
-                                  <p:stCondLst>
-                                    <p:cond delay="0"/>
-                                  </p:stCondLst>
-                                  <p:childTnLst>
-                                    <p:set>
-                                      <p:cBhvr>
-                                        <p:cTn id="14" dur="1" fill="hold">
-                                          <p:stCondLst>
-                                            <p:cond delay="0"/>
-                                          </p:stCondLst>
-                                        </p:cTn>
-                                        <p:tgtEl>
-                                          <p:spTgt spid="3">
-                                            <p:txEl>
-                                              <p:pRg st="3" end="3"/>
-                                            </p:txEl>
-                                          </p:spTgt>
-                                        </p:tgtEl>
-                                        <p:attrNameLst>
-                                          <p:attrName>style.visibility</p:attrName>
-                                        </p:attrNameLst>
-                                      </p:cBhvr>
-                                      <p:to>
-                                        <p:strVal val="visible"/>
-                                      </p:to>
-                                    </p:set>
-                                  </p:childTnLst>
-                                </p:cTn>
-                              </p:par>
-                            </p:childTnLst>
-                          </p:cTn>
-                        </p:par>
-                      </p:childTnLst>
-                    </p:cTn>
-                  </p:par>
-                  <p:par>
-                    <p:cTn id="15" fill="hold">
-                      <p:stCondLst>
-                        <p:cond delay="indefinite"/>
-                      </p:stCondLst>
-                      <p:childTnLst>
-                        <p:par>
-                          <p:cTn id="16" fill="hold">
-                            <p:stCondLst>
-                              <p:cond delay="0"/>
-                            </p:stCondLst>
-                            <p:childTnLst>
-                              <p:par>
-                                <p:cTn id="17" presetID="1" presetClass="entr" presetSubtype="0" fill="hold" grpId="0" nodeType="clickEffect">
-                                  <p:stCondLst>
-                                    <p:cond delay="0"/>
-                                  </p:stCondLst>
-                                  <p:childTnLst>
-                                    <p:set>
-                                      <p:cBhvr>
-                                        <p:cTn id="18" dur="1" fill="hold">
-                                          <p:stCondLst>
-                                            <p:cond delay="0"/>
-                                          </p:stCondLst>
-                                        </p:cTn>
-                                        <p:tgtEl>
-                                          <p:spTgt spid="3">
-                                            <p:txEl>
-                                              <p:pRg st="4" end="4"/>
-                                            </p:txEl>
-                                          </p:spTgt>
-                                        </p:tgtEl>
-                                        <p:attrNameLst>
-                                          <p:attrName>style.visibility</p:attrName>
-                                        </p:attrNameLst>
-                                      </p:cBhvr>
-                                      <p:to>
-                                        <p:strVal val="visible"/>
-                                      </p:to>
-                                    </p:set>
-                                  </p:childTnLst>
-                                </p:cTn>
-                              </p:par>
-                            </p:childTnLst>
-                          </p:cTn>
-                        </p:par>
-                      </p:childTnLst>
-                    </p:cTn>
-                  </p:par>
-                </p:childTnLst>
-              </p:cTn>
-              <p:prevCondLst>
-                <p:cond evt="onPrev" delay="0">
-                  <p:tgtEl>
-                    <p:sldTgt/>
-                  </p:tgtEl>
-                </p:cond>
-              </p:prevCondLst>
-              <p:nextCondLst>
-                <p:cond evt="onNext" delay="0">
-                  <p:tgtEl>
-                    <p:sldTgt/>
-                  </p:tgtEl>
-                </p:cond>
-              </p:nextCondLst>
-            </p:seq>
-          </p:childTnLst>
-        </p:cTn>
-      </p:par>
-    </p:tnLst>
-    <p:bldLst>
-      <p:bldP spid="3" grpId="0" build="p"/>
-    </p:bldLst>
-  </p:timing>
-</p:sld>
-</file>
-
-<file path=ppt/slides/slide6.xml><?xml version="1.0" encoding="utf-8"?>
-<p:sld xmlns:a="http://schemas.openxmlformats.org/drawingml/2006/main" xmlns:r="http://schemas.openxmlformats.org/officeDocument/2006/relationships" xmlns:p="http://schemas.openxmlformats.org/presentationml/2006/main">
-  <p:cSld>
-    <p:spTree>
-      <p:nvGrpSpPr>
-        <p:cNvPr id="1" name=""/>
-        <p:cNvGrpSpPr/>
-        <p:nvPr/>
-      </p:nvGrpSpPr>
-      <p:grpSpPr>
-        <a:xfrm>
-          <a:off x="0" y="0"/>
-          <a:ext cx="0" cy="0"/>
-          <a:chOff x="0" y="0"/>
-          <a:chExt cx="0" cy="0"/>
-        </a:xfrm>
-      </p:grpSpPr>
-      <p:sp>
-        <p:nvSpPr>
-          <p:cNvPr id="2" name="Title 1"/>
-          <p:cNvSpPr>
-            <a:spLocks noGrp="1"/>
-          </p:cNvSpPr>
-          <p:nvPr>
-            <p:ph type="title"/>
-          </p:nvPr>
-        </p:nvSpPr>
-        <p:spPr/>
-        <p:txBody>
-          <a:bodyPr/>
-          <a:lstStyle/>
-          <a:p>
-            <a:r>
-              <a:rPr lang="en-US" dirty="0" err="1"/>
-              <a:t>g</a:t>
-            </a:r>
-            <a:r>
-              <a:rPr lang="en-US" dirty="0" err="1" smtClean="0"/>
-              <a:t>it</a:t>
-            </a:r>
-            <a:r>
-              <a:rPr lang="en-US" dirty="0" smtClean="0"/>
-              <a:t> is..</a:t>
-            </a:r>
-            <a:endParaRPr lang="en-US" dirty="0"/>
-          </a:p>
-        </p:txBody>
-      </p:sp>
-      <p:pic>
-        <p:nvPicPr>
-          <p:cNvPr id="4" name="Picture 3">
-            <a:hlinkClick r:id="rId2"/>
-          </p:cNvPr>
-          <p:cNvPicPr>
-            <a:picLocks noChangeAspect="1"/>
-          </p:cNvPicPr>
-          <p:nvPr/>
-        </p:nvPicPr>
-        <p:blipFill>
-          <a:blip r:embed="rId3"/>
-          <a:stretch>
-            <a:fillRect/>
-          </a:stretch>
-        </p:blipFill>
-        <p:spPr>
-          <a:xfrm>
-            <a:off x="1316923" y="1417638"/>
-            <a:ext cx="6302423" cy="4851505"/>
-          </a:xfrm>
-          <a:prstGeom prst="rect">
-            <a:avLst/>
-          </a:prstGeom>
-        </p:spPr>
-      </p:pic>
-    </p:spTree>
-    <p:extLst>
-      <p:ext uri="{BB962C8B-B14F-4D97-AF65-F5344CB8AC3E}">
-        <p14:creationId xmlns:p14="http://schemas.microsoft.com/office/powerpoint/2010/main" val="3415646396"/>
-      </p:ext>
-    </p:extLst>
-  </p:cSld>
-  <p:clrMapOvr>
-    <a:masterClrMapping/>
-  </p:clrMapOvr>
-  <p:timing>
-    <p:tnLst>
-      <p:par>
-        <p:cTn xmlns:p14="http://schemas.microsoft.com/office/powerpoint/2010/main" id="1" dur="indefinite" restart="never" nodeType="tmRoot"/>
-      </p:par>
-    </p:tnLst>
-  </p:timing>
-</p:sld>
-</file>
-
-<file path=ppt/slides/slide7.xml><?xml version="1.0" encoding="utf-8"?>
-<p:sld xmlns:a="http://schemas.openxmlformats.org/drawingml/2006/main" xmlns:r="http://schemas.openxmlformats.org/officeDocument/2006/relationships" xmlns:p="http://schemas.openxmlformats.org/presentationml/2006/main">
-  <p:cSld>
-    <p:spTree>
-      <p:nvGrpSpPr>
-        <p:cNvPr id="1" name=""/>
-        <p:cNvGrpSpPr/>
-        <p:nvPr/>
-      </p:nvGrpSpPr>
-      <p:grpSpPr>
-        <a:xfrm>
-          <a:off x="0" y="0"/>
-          <a:ext cx="0" cy="0"/>
-          <a:chOff x="0" y="0"/>
-          <a:chExt cx="0" cy="0"/>
-        </a:xfrm>
-      </p:grpSpPr>
-      <p:sp>
-        <p:nvSpPr>
-          <p:cNvPr id="2" name="Title 1"/>
-          <p:cNvSpPr>
-            <a:spLocks noGrp="1"/>
-          </p:cNvSpPr>
-          <p:nvPr>
-            <p:ph type="title"/>
-          </p:nvPr>
-        </p:nvSpPr>
-        <p:spPr/>
-        <p:txBody>
-          <a:bodyPr/>
-          <a:lstStyle/>
-          <a:p>
-            <a:r>
-              <a:rPr lang="en-US" dirty="0" smtClean="0"/>
-              <a:t>Scenario</a:t>
-            </a:r>
-            <a:endParaRPr lang="en-US" dirty="0"/>
-          </a:p>
-        </p:txBody>
-      </p:sp>
-      <p:sp>
-        <p:nvSpPr>
-          <p:cNvPr id="3" name="Content Placeholder 2"/>
-          <p:cNvSpPr>
-            <a:spLocks noGrp="1"/>
-          </p:cNvSpPr>
-          <p:nvPr>
-            <p:ph idx="1"/>
-          </p:nvPr>
-        </p:nvSpPr>
-        <p:spPr>
-          <a:xfrm>
-            <a:off x="457200" y="1600200"/>
-            <a:ext cx="8229600" cy="4870760"/>
-          </a:xfrm>
-        </p:spPr>
-        <p:txBody>
-          <a:bodyPr>
-            <a:normAutofit/>
-          </a:bodyPr>
-          <a:lstStyle/>
-          <a:p>
-            <a:pPr marL="342900" lvl="1" indent="-342900">
-              <a:buFont typeface="Arial"/>
-              <a:buChar char="•"/>
-            </a:pPr>
-            <a:r>
-              <a:rPr lang="en-US" sz="3200" dirty="0" smtClean="0"/>
-              <a:t>Bob writes </a:t>
-            </a:r>
-            <a:r>
-              <a:rPr lang="en-US" sz="3200" dirty="0"/>
-              <a:t>a bug just before </a:t>
-            </a:r>
-            <a:r>
-              <a:rPr lang="en-US" sz="3200" dirty="0" smtClean="0"/>
-              <a:t>a big release</a:t>
-            </a:r>
-          </a:p>
-          <a:p>
-            <a:r>
-              <a:rPr lang="en-US" dirty="0" smtClean="0"/>
-              <a:t>With poor version control</a:t>
-            </a:r>
-          </a:p>
-          <a:p>
-            <a:pPr lvl="1"/>
-            <a:r>
-              <a:rPr lang="en-US" dirty="0" smtClean="0"/>
-              <a:t>The customer is not happy</a:t>
-            </a:r>
-          </a:p>
-          <a:p>
-            <a:r>
-              <a:rPr lang="en-US" dirty="0" smtClean="0"/>
-              <a:t>With proper version control</a:t>
-            </a:r>
-          </a:p>
-          <a:p>
-            <a:pPr lvl="1"/>
-            <a:r>
-              <a:rPr lang="en-US" dirty="0" smtClean="0"/>
-              <a:t>Bob was working on separate branch</a:t>
-            </a:r>
-          </a:p>
-          <a:p>
-            <a:pPr lvl="1"/>
-            <a:r>
-              <a:rPr lang="en-US" dirty="0" smtClean="0"/>
-              <a:t>Bob pushes to the release branch</a:t>
-            </a:r>
-          </a:p>
-          <a:p>
-            <a:pPr lvl="2"/>
-            <a:r>
-              <a:rPr lang="en-US" dirty="0" smtClean="0"/>
-              <a:t>The team will revert to the last commit before Bob’s blunder</a:t>
-            </a:r>
-          </a:p>
-          <a:p>
-            <a:pPr lvl="1"/>
-            <a:r>
-              <a:rPr lang="en-US" dirty="0" smtClean="0"/>
-              <a:t>Customer never sees the bug</a:t>
-            </a:r>
-          </a:p>
-        </p:txBody>
-      </p:sp>
-    </p:spTree>
-    <p:extLst>
-      <p:ext uri="{BB962C8B-B14F-4D97-AF65-F5344CB8AC3E}">
-        <p14:creationId xmlns:p14="http://schemas.microsoft.com/office/powerpoint/2010/main" val="2774756018"/>
-      </p:ext>
-    </p:extLst>
-  </p:cSld>
-  <p:clrMapOvr>
-    <a:masterClrMapping/>
-  </p:clrMapOvr>
-  <p:timing>
-    <p:tnLst>
-      <p:par>
-        <p:cTn xmlns:p14="http://schemas.microsoft.com/office/powerpoint/2010/main" id="1" dur="indefinite" restart="never" nodeType="tmRoot">
-          <p:childTnLst>
-            <p:seq concurrent="1" nextAc="seek">
-              <p:cTn id="2" dur="indefinite" nodeType="mainSeq">
-                <p:childTnLst>
-                  <p:par>
-                    <p:cTn id="3" fill="hold">
-                      <p:stCondLst>
-                        <p:cond delay="indefinite"/>
-                      </p:stCondLst>
-                      <p:childTnLst>
-                        <p:par>
-                          <p:cTn id="4" fill="hold">
-                            <p:stCondLst>
-                              <p:cond delay="0"/>
-                            </p:stCondLst>
-                            <p:childTnLst>
-                              <p:par>
-                                <p:cTn id="5" presetID="1" presetClass="entr" presetSubtype="0" fill="hold" nodeType="clickEffect">
-                                  <p:stCondLst>
-                                    <p:cond delay="0"/>
-                                  </p:stCondLst>
-                                  <p:childTnLst>
-                                    <p:set>
-                                      <p:cBhvr>
-                                        <p:cTn id="6" dur="1" fill="hold">
-                                          <p:stCondLst>
-                                            <p:cond delay="0"/>
-                                          </p:stCondLst>
-                                        </p:cTn>
-                                        <p:tgtEl>
-                                          <p:spTgt spid="3">
-                                            <p:txEl>
-                                              <p:pRg st="1" end="1"/>
-                                            </p:txEl>
-                                          </p:spTgt>
-                                        </p:tgtEl>
-                                        <p:attrNameLst>
-                                          <p:attrName>style.visibility</p:attrName>
-                                        </p:attrNameLst>
-                                      </p:cBhvr>
-                                      <p:to>
-                                        <p:strVal val="visible"/>
-                                      </p:to>
-                                    </p:set>
-                                  </p:childTnLst>
-                                </p:cTn>
-                              </p:par>
-                            </p:childTnLst>
-                          </p:cTn>
-                        </p:par>
-                      </p:childTnLst>
-                    </p:cTn>
-                  </p:par>
-                  <p:par>
-                    <p:cTn id="7" fill="hold">
-                      <p:stCondLst>
-                        <p:cond delay="indefinite"/>
-                      </p:stCondLst>
-                      <p:childTnLst>
-                        <p:par>
-                          <p:cTn id="8" fill="hold">
-                            <p:stCondLst>
-                              <p:cond delay="0"/>
-                            </p:stCondLst>
-                            <p:childTnLst>
-                              <p:par>
-                                <p:cTn id="9" presetID="1" presetClass="entr" presetSubtype="0" fill="hold" grpId="0" nodeType="clickEffect">
-                                  <p:stCondLst>
-                                    <p:cond delay="0"/>
-                                  </p:stCondLst>
-                                  <p:childTnLst>
-                                    <p:set>
-                                      <p:cBhvr>
-                                        <p:cTn id="10" dur="1" fill="hold">
-                                          <p:stCondLst>
-                                            <p:cond delay="0"/>
-                                          </p:stCondLst>
-                                        </p:cTn>
-                                        <p:tgtEl>
-                                          <p:spTgt spid="3">
-                                            <p:txEl>
-                                              <p:pRg st="2" end="2"/>
-                                            </p:txEl>
-                                          </p:spTgt>
-                                        </p:tgtEl>
-                                        <p:attrNameLst>
-                                          <p:attrName>style.visibility</p:attrName>
-                                        </p:attrNameLst>
-                                      </p:cBhvr>
-                                      <p:to>
-                                        <p:strVal val="visible"/>
-                                      </p:to>
-                                    </p:set>
-                                  </p:childTnLst>
-                                </p:cTn>
-                              </p:par>
-                            </p:childTnLst>
-                          </p:cTn>
-                        </p:par>
-                      </p:childTnLst>
-                    </p:cTn>
-                  </p:par>
-                  <p:par>
-                    <p:cTn id="11" fill="hold">
-                      <p:stCondLst>
-                        <p:cond delay="indefinite"/>
-                      </p:stCondLst>
-                      <p:childTnLst>
-                        <p:par>
-                          <p:cTn id="12" fill="hold">
-                            <p:stCondLst>
-                              <p:cond delay="0"/>
-                            </p:stCondLst>
-                            <p:childTnLst>
-                              <p:par>
-                                <p:cTn id="13" presetID="1" presetClass="entr" presetSubtype="0" fill="hold" grpId="0" nodeType="clickEffect">
-                                  <p:stCondLst>
-                                    <p:cond delay="0"/>
-                                  </p:stCondLst>
-                                  <p:childTnLst>
-                                    <p:set>
-                                      <p:cBhvr>
-                                        <p:cTn id="14" dur="1" fill="hold">
-                                          <p:stCondLst>
-                                            <p:cond delay="0"/>
-                                          </p:stCondLst>
-                                        </p:cTn>
-                                        <p:tgtEl>
-                                          <p:spTgt spid="3">
-                                            <p:txEl>
-                                              <p:pRg st="3" end="3"/>
-                                            </p:txEl>
-                                          </p:spTgt>
-                                        </p:tgtEl>
-                                        <p:attrNameLst>
-                                          <p:attrName>style.visibility</p:attrName>
-                                        </p:attrNameLst>
-                                      </p:cBhvr>
-                                      <p:to>
-                                        <p:strVal val="visible"/>
-                                      </p:to>
-                                    </p:set>
-                                  </p:childTnLst>
-                                </p:cTn>
-                              </p:par>
-                            </p:childTnLst>
-                          </p:cTn>
-                        </p:par>
-                      </p:childTnLst>
-                    </p:cTn>
-                  </p:par>
-                  <p:par>
-                    <p:cTn id="15" fill="hold">
-                      <p:stCondLst>
-                        <p:cond delay="indefinite"/>
-                      </p:stCondLst>
-                      <p:childTnLst>
-                        <p:par>
-                          <p:cTn id="16" fill="hold">
-                            <p:stCondLst>
-                              <p:cond delay="0"/>
-                            </p:stCondLst>
-                            <p:childTnLst>
-                              <p:par>
-                                <p:cTn id="17" presetID="1" presetClass="entr" presetSubtype="0" fill="hold" grpId="0" nodeType="clickEffect">
-                                  <p:stCondLst>
-                                    <p:cond delay="0"/>
-                                  </p:stCondLst>
-                                  <p:childTnLst>
-                                    <p:set>
-                                      <p:cBhvr>
-                                        <p:cTn id="18" dur="1" fill="hold">
-                                          <p:stCondLst>
-                                            <p:cond delay="0"/>
-                                          </p:stCondLst>
-                                        </p:cTn>
-                                        <p:tgtEl>
-                                          <p:spTgt spid="3">
-                                            <p:txEl>
-                                              <p:pRg st="4" end="4"/>
-                                            </p:txEl>
-                                          </p:spTgt>
-                                        </p:tgtEl>
-                                        <p:attrNameLst>
-                                          <p:attrName>style.visibility</p:attrName>
-                                        </p:attrNameLst>
-                                      </p:cBhvr>
-                                      <p:to>
-                                        <p:strVal val="visible"/>
-                                      </p:to>
-                                    </p:set>
-                                  </p:childTnLst>
-                                </p:cTn>
-                              </p:par>
-                            </p:childTnLst>
-                          </p:cTn>
-                        </p:par>
-                      </p:childTnLst>
-                    </p:cTn>
-                  </p:par>
-                  <p:par>
-                    <p:cTn id="19" fill="hold">
-                      <p:stCondLst>
-                        <p:cond delay="indefinite"/>
-                      </p:stCondLst>
-                      <p:childTnLst>
-                        <p:par>
-                          <p:cTn id="20" fill="hold">
-                            <p:stCondLst>
-                              <p:cond delay="0"/>
-                            </p:stCondLst>
-                            <p:childTnLst>
-                              <p:par>
-                                <p:cTn id="21" presetID="1" presetClass="entr" presetSubtype="0" fill="hold" grpId="0" nodeType="clickEffect">
-                                  <p:stCondLst>
-                                    <p:cond delay="0"/>
-                                  </p:stCondLst>
-                                  <p:childTnLst>
-                                    <p:set>
-                                      <p:cBhvr>
-                                        <p:cTn id="22" dur="1" fill="hold">
-                                          <p:stCondLst>
-                                            <p:cond delay="0"/>
-                                          </p:stCondLst>
-                                        </p:cTn>
-                                        <p:tgtEl>
-                                          <p:spTgt spid="3">
-                                            <p:txEl>
-                                              <p:pRg st="5" end="5"/>
-                                            </p:txEl>
-                                          </p:spTgt>
-                                        </p:tgtEl>
-                                        <p:attrNameLst>
-                                          <p:attrName>style.visibility</p:attrName>
-                                        </p:attrNameLst>
-                                      </p:cBhvr>
-                                      <p:to>
-                                        <p:strVal val="visible"/>
-                                      </p:to>
-                                    </p:set>
-                                  </p:childTnLst>
-                                </p:cTn>
-                              </p:par>
-                            </p:childTnLst>
-                          </p:cTn>
-                        </p:par>
-                      </p:childTnLst>
-                    </p:cTn>
-                  </p:par>
-                  <p:par>
-                    <p:cTn id="23" fill="hold">
-                      <p:stCondLst>
-                        <p:cond delay="indefinite"/>
-                      </p:stCondLst>
-                      <p:childTnLst>
-                        <p:par>
-                          <p:cTn id="24" fill="hold">
-                            <p:stCondLst>
-                              <p:cond delay="0"/>
-                            </p:stCondLst>
-                            <p:childTnLst>
-                              <p:par>
-                                <p:cTn id="25" presetID="1" presetClass="entr" presetSubtype="0" fill="hold" grpId="0" nodeType="clickEffect">
-                                  <p:stCondLst>
-                                    <p:cond delay="0"/>
-                                  </p:stCondLst>
-                                  <p:childTnLst>
-                                    <p:set>
-                                      <p:cBhvr>
-                                        <p:cTn id="26" dur="1" fill="hold">
-                                          <p:stCondLst>
-                                            <p:cond delay="0"/>
-                                          </p:stCondLst>
-                                        </p:cTn>
-                                        <p:tgtEl>
-                                          <p:spTgt spid="3">
-                                            <p:txEl>
-                                              <p:pRg st="6" end="6"/>
-                                            </p:txEl>
-                                          </p:spTgt>
-                                        </p:tgtEl>
-                                        <p:attrNameLst>
-                                          <p:attrName>style.visibility</p:attrName>
-                                        </p:attrNameLst>
-                                      </p:cBhvr>
-                                      <p:to>
-                                        <p:strVal val="visible"/>
-                                      </p:to>
-                                    </p:set>
-                                  </p:childTnLst>
-                                </p:cTn>
-                              </p:par>
-                            </p:childTnLst>
-                          </p:cTn>
-                        </p:par>
-                      </p:childTnLst>
-                    </p:cTn>
-                  </p:par>
-                  <p:par>
-                    <p:cTn id="27" fill="hold">
-                      <p:stCondLst>
-                        <p:cond delay="indefinite"/>
-                      </p:stCondLst>
-                      <p:childTnLst>
-                        <p:par>
-                          <p:cTn id="28" fill="hold">
-                            <p:stCondLst>
-                              <p:cond delay="0"/>
-                            </p:stCondLst>
-                            <p:childTnLst>
-                              <p:par>
-                                <p:cTn id="29" presetID="1" presetClass="entr" presetSubtype="0" fill="hold" grpId="0" nodeType="clickEffect">
-                                  <p:stCondLst>
-                                    <p:cond delay="0"/>
-                                  </p:stCondLst>
-                                  <p:childTnLst>
-                                    <p:set>
-                                      <p:cBhvr>
-                                        <p:cTn id="30" dur="1" fill="hold">
+                                        <p:cTn id="28" dur="1" fill="hold">
                                           <p:stCondLst>
                                             <p:cond delay="0"/>
                                           </p:stCondLst>
@@ -7649,7 +7478,15 @@
           <a:p>
             <a:r>
               <a:rPr lang="en-US" dirty="0" smtClean="0"/>
-              <a:t>Making a repo</a:t>
+              <a:t>To Make </a:t>
+            </a:r>
+            <a:r>
+              <a:rPr lang="en-US" dirty="0" smtClean="0"/>
+              <a:t>a </a:t>
+            </a:r>
+            <a:r>
+              <a:rPr lang="en-US" dirty="0" smtClean="0"/>
+              <a:t>Repository</a:t>
             </a:r>
             <a:endParaRPr lang="en-US" dirty="0"/>
           </a:p>

</xml_diff>